<commit_message>
Update gitbook 2024-09-04 20:43:15
</commit_message>
<xml_diff>
--- a/Buttons/Buttons.pptx
+++ b/Buttons/Buttons.pptx
@@ -218,7 +218,7 @@
           <a:p>
             <a:fld id="{19104133-B5B0-4351-8158-4F0E5EB1E2BF}" type="datetimeFigureOut">
               <a:rPr lang="en-US" smtClean="0"/>
-              <a:t>9/6/2022</a:t>
+              <a:t>9/4/2024</a:t>
             </a:fld>
             <a:endParaRPr lang="en-US"/>
           </a:p>
@@ -1972,7 +1972,7 @@
             <a:fld id="{1C2D31DE-C454-491C-B5C3-F097855E3DF7}" type="datetime4">
               <a:rPr lang="en-US" smtClean="0"/>
               <a:pPr/>
-              <a:t>September 6, 2022</a:t>
+              <a:t>September 4, 2024</a:t>
             </a:fld>
             <a:endParaRPr lang="en-US" dirty="0"/>
           </a:p>
@@ -5364,7 +5364,7 @@
           <a:p>
             <a:fld id="{5958763E-B898-436D-883D-03711491D54A}" type="datetimeFigureOut">
               <a:rPr lang="en-US" smtClean="0"/>
-              <a:t>9/6/2022</a:t>
+              <a:t>9/4/2024</a:t>
             </a:fld>
             <a:endParaRPr lang="en-US"/>
           </a:p>
@@ -5557,7 +5557,7 @@
           <a:p>
             <a:fld id="{5958763E-B898-436D-883D-03711491D54A}" type="datetimeFigureOut">
               <a:rPr lang="en-US" smtClean="0"/>
-              <a:t>9/6/2022</a:t>
+              <a:t>9/4/2024</a:t>
             </a:fld>
             <a:endParaRPr lang="en-US"/>
           </a:p>
@@ -5807,7 +5807,7 @@
           <a:p>
             <a:fld id="{5958763E-B898-436D-883D-03711491D54A}" type="datetimeFigureOut">
               <a:rPr lang="en-US" smtClean="0"/>
-              <a:t>9/6/2022</a:t>
+              <a:t>9/4/2024</a:t>
             </a:fld>
             <a:endParaRPr lang="en-US"/>
           </a:p>
@@ -6155,7 +6155,7 @@
           <a:p>
             <a:fld id="{5958763E-B898-436D-883D-03711491D54A}" type="datetimeFigureOut">
               <a:rPr lang="en-US" smtClean="0"/>
-              <a:t>9/6/2022</a:t>
+              <a:t>9/4/2024</a:t>
             </a:fld>
             <a:endParaRPr lang="en-US"/>
           </a:p>
@@ -6571,7 +6571,7 @@
           <a:p>
             <a:fld id="{5958763E-B898-436D-883D-03711491D54A}" type="datetimeFigureOut">
               <a:rPr lang="en-US" smtClean="0"/>
-              <a:t>9/6/2022</a:t>
+              <a:t>9/4/2024</a:t>
             </a:fld>
             <a:endParaRPr lang="en-US"/>
           </a:p>
@@ -7072,7 +7072,7 @@
           <a:p>
             <a:fld id="{5958763E-B898-436D-883D-03711491D54A}" type="datetimeFigureOut">
               <a:rPr lang="en-US" smtClean="0"/>
-              <a:t>9/6/2022</a:t>
+              <a:t>9/4/2024</a:t>
             </a:fld>
             <a:endParaRPr lang="en-US"/>
           </a:p>
@@ -7523,7 +7523,7 @@
           <a:p>
             <a:fld id="{5958763E-B898-436D-883D-03711491D54A}" type="datetimeFigureOut">
               <a:rPr lang="en-US" smtClean="0"/>
-              <a:t>9/6/2022</a:t>
+              <a:t>9/4/2024</a:t>
             </a:fld>
             <a:endParaRPr lang="en-US"/>
           </a:p>
@@ -8134,7 +8134,7 @@
           <a:p>
             <a:fld id="{5958763E-B898-436D-883D-03711491D54A}" type="datetimeFigureOut">
               <a:rPr lang="en-US" smtClean="0"/>
-              <a:t>9/6/2022</a:t>
+              <a:t>9/4/2024</a:t>
             </a:fld>
             <a:endParaRPr lang="en-US"/>
           </a:p>
@@ -8905,7 +8905,7 @@
           <a:p>
             <a:fld id="{5958763E-B898-436D-883D-03711491D54A}" type="datetimeFigureOut">
               <a:rPr lang="en-US" smtClean="0"/>
-              <a:t>9/6/2022</a:t>
+              <a:t>9/4/2024</a:t>
             </a:fld>
             <a:endParaRPr lang="en-US"/>
           </a:p>
@@ -9009,7 +9009,7 @@
           <a:p>
             <a:fld id="{5958763E-B898-436D-883D-03711491D54A}" type="datetimeFigureOut">
               <a:rPr lang="en-US" smtClean="0"/>
-              <a:t>9/6/2022</a:t>
+              <a:t>9/4/2024</a:t>
             </a:fld>
             <a:endParaRPr lang="en-US"/>
           </a:p>
@@ -9336,7 +9336,7 @@
             <a:fld id="{1C2D31DE-C454-491C-B5C3-F097855E3DF7}" type="datetime4">
               <a:rPr lang="en-US" smtClean="0"/>
               <a:pPr/>
-              <a:t>September 6, 2022</a:t>
+              <a:t>September 4, 2024</a:t>
             </a:fld>
             <a:endParaRPr lang="en-US" dirty="0"/>
           </a:p>
@@ -12488,7 +12488,7 @@
           <a:p>
             <a:fld id="{5958763E-B898-436D-883D-03711491D54A}" type="datetimeFigureOut">
               <a:rPr lang="en-US" smtClean="0"/>
-              <a:t>9/6/2022</a:t>
+              <a:t>9/4/2024</a:t>
             </a:fld>
             <a:endParaRPr lang="en-US"/>
           </a:p>
@@ -12612,7 +12612,7 @@
           <a:p>
             <a:fld id="{5958763E-B898-436D-883D-03711491D54A}" type="datetimeFigureOut">
               <a:rPr lang="en-US" smtClean="0"/>
-              <a:t>9/6/2022</a:t>
+              <a:t>9/4/2024</a:t>
             </a:fld>
             <a:endParaRPr lang="en-US"/>
           </a:p>
@@ -12736,7 +12736,7 @@
           <a:p>
             <a:fld id="{5958763E-B898-436D-883D-03711491D54A}" type="datetimeFigureOut">
               <a:rPr lang="en-US" smtClean="0"/>
-              <a:t>9/6/2022</a:t>
+              <a:t>9/4/2024</a:t>
             </a:fld>
             <a:endParaRPr lang="en-US"/>
           </a:p>
@@ -12860,7 +12860,7 @@
           <a:p>
             <a:fld id="{5958763E-B898-436D-883D-03711491D54A}" type="datetimeFigureOut">
               <a:rPr lang="en-US" smtClean="0"/>
-              <a:t>9/6/2022</a:t>
+              <a:t>9/4/2024</a:t>
             </a:fld>
             <a:endParaRPr lang="en-US"/>
           </a:p>
@@ -12984,7 +12984,7 @@
           <a:p>
             <a:fld id="{5958763E-B898-436D-883D-03711491D54A}" type="datetimeFigureOut">
               <a:rPr lang="en-US" smtClean="0"/>
-              <a:t>9/6/2022</a:t>
+              <a:t>9/4/2024</a:t>
             </a:fld>
             <a:endParaRPr lang="en-US"/>
           </a:p>
@@ -13108,7 +13108,7 @@
           <a:p>
             <a:fld id="{5958763E-B898-436D-883D-03711491D54A}" type="datetimeFigureOut">
               <a:rPr lang="en-US" smtClean="0"/>
-              <a:t>9/6/2022</a:t>
+              <a:t>9/4/2024</a:t>
             </a:fld>
             <a:endParaRPr lang="en-US"/>
           </a:p>
@@ -13232,7 +13232,7 @@
           <a:p>
             <a:fld id="{5958763E-B898-436D-883D-03711491D54A}" type="datetimeFigureOut">
               <a:rPr lang="en-US" smtClean="0"/>
-              <a:t>9/6/2022</a:t>
+              <a:t>9/4/2024</a:t>
             </a:fld>
             <a:endParaRPr lang="en-US"/>
           </a:p>
@@ -13356,7 +13356,7 @@
           <a:p>
             <a:fld id="{5958763E-B898-436D-883D-03711491D54A}" type="datetimeFigureOut">
               <a:rPr lang="en-US" smtClean="0"/>
-              <a:t>9/6/2022</a:t>
+              <a:t>9/4/2024</a:t>
             </a:fld>
             <a:endParaRPr lang="en-US"/>
           </a:p>
@@ -13489,7 +13489,7 @@
           <a:p>
             <a:fld id="{5958763E-B898-436D-883D-03711491D54A}" type="datetimeFigureOut">
               <a:rPr lang="en-US" smtClean="0"/>
-              <a:t>9/6/2022</a:t>
+              <a:t>9/4/2024</a:t>
             </a:fld>
             <a:endParaRPr lang="en-US"/>
           </a:p>
@@ -16828,7 +16828,7 @@
             <a:fld id="{1C2D31DE-C454-491C-B5C3-F097855E3DF7}" type="datetime4">
               <a:rPr lang="en-US" smtClean="0"/>
               <a:pPr/>
-              <a:t>September 6, 2022</a:t>
+              <a:t>September 4, 2024</a:t>
             </a:fld>
             <a:endParaRPr lang="en-US" dirty="0"/>
           </a:p>
@@ -29064,7 +29064,7 @@
           <a:p>
             <a:fld id="{5958763E-B898-436D-883D-03711491D54A}" type="datetimeFigureOut">
               <a:rPr lang="en-US" smtClean="0"/>
-              <a:t>9/6/2022</a:t>
+              <a:t>9/4/2024</a:t>
             </a:fld>
             <a:endParaRPr lang="en-US"/>
           </a:p>
@@ -29466,7 +29466,7 @@
           <a:p>
             <a:fld id="{5958763E-B898-436D-883D-03711491D54A}" type="datetimeFigureOut">
               <a:rPr lang="en-US" smtClean="0"/>
-              <a:t>9/6/2022</a:t>
+              <a:t>9/4/2024</a:t>
             </a:fld>
             <a:endParaRPr lang="en-US"/>
           </a:p>
@@ -29760,7 +29760,7 @@
           <a:p>
             <a:fld id="{5958763E-B898-436D-883D-03711491D54A}" type="datetimeFigureOut">
               <a:rPr lang="en-US" smtClean="0"/>
-              <a:t>9/6/2022</a:t>
+              <a:t>9/4/2024</a:t>
             </a:fld>
             <a:endParaRPr lang="en-US"/>
           </a:p>
@@ -29961,7 +29961,7 @@
           <a:p>
             <a:fld id="{5958763E-B898-436D-883D-03711491D54A}" type="datetimeFigureOut">
               <a:rPr lang="en-US" smtClean="0"/>
-              <a:t>9/6/2022</a:t>
+              <a:t>9/4/2024</a:t>
             </a:fld>
             <a:endParaRPr lang="en-US"/>
           </a:p>
@@ -30222,7 +30222,7 @@
           <a:p>
             <a:fld id="{5958763E-B898-436D-883D-03711491D54A}" type="datetimeFigureOut">
               <a:rPr lang="en-US" smtClean="0"/>
-              <a:t>9/6/2022</a:t>
+              <a:t>9/4/2024</a:t>
             </a:fld>
             <a:endParaRPr lang="en-US"/>
           </a:p>
@@ -30730,7 +30730,7 @@
           <a:p>
             <a:fld id="{5958763E-B898-436D-883D-03711491D54A}" type="datetimeFigureOut">
               <a:rPr lang="en-US" smtClean="0"/>
-              <a:t>9/6/2022</a:t>
+              <a:t>9/4/2024</a:t>
             </a:fld>
             <a:endParaRPr lang="en-US"/>
           </a:p>
@@ -31209,7 +31209,7 @@
           <a:p>
             <a:fld id="{5958763E-B898-436D-883D-03711491D54A}" type="datetimeFigureOut">
               <a:rPr lang="en-US" smtClean="0"/>
-              <a:t>9/6/2022</a:t>
+              <a:t>9/4/2024</a:t>
             </a:fld>
             <a:endParaRPr lang="en-US"/>
           </a:p>
@@ -32028,7 +32028,7 @@
           <a:p>
             <a:fld id="{5958763E-B898-436D-883D-03711491D54A}" type="datetimeFigureOut">
               <a:rPr lang="en-US" smtClean="0"/>
-              <a:t>9/6/2022</a:t>
+              <a:t>9/4/2024</a:t>
             </a:fld>
             <a:endParaRPr lang="en-US"/>
           </a:p>
@@ -32229,7 +32229,7 @@
           <a:p>
             <a:fld id="{5958763E-B898-436D-883D-03711491D54A}" type="datetimeFigureOut">
               <a:rPr lang="en-US" smtClean="0"/>
-              <a:t>9/6/2022</a:t>
+              <a:t>9/4/2024</a:t>
             </a:fld>
             <a:endParaRPr lang="en-US"/>
           </a:p>
@@ -32564,7 +32564,7 @@
           <a:p>
             <a:fld id="{5958763E-B898-436D-883D-03711491D54A}" type="datetimeFigureOut">
               <a:rPr lang="en-US" smtClean="0"/>
-              <a:t>9/6/2022</a:t>
+              <a:t>9/4/2024</a:t>
             </a:fld>
             <a:endParaRPr lang="en-US"/>
           </a:p>
@@ -32794,7 +32794,7 @@
           <a:p>
             <a:fld id="{5958763E-B898-436D-883D-03711491D54A}" type="datetimeFigureOut">
               <a:rPr lang="en-US" smtClean="0"/>
-              <a:t>9/6/2022</a:t>
+              <a:t>9/4/2024</a:t>
             </a:fld>
             <a:endParaRPr lang="en-US"/>
           </a:p>
@@ -33038,7 +33038,7 @@
           <a:p>
             <a:fld id="{5958763E-B898-436D-883D-03711491D54A}" type="datetimeFigureOut">
               <a:rPr lang="en-US" smtClean="0"/>
-              <a:t>9/6/2022</a:t>
+              <a:t>9/4/2024</a:t>
             </a:fld>
             <a:endParaRPr lang="en-US"/>
           </a:p>
@@ -36662,7 +36662,13 @@
               <a:rPr lang="en-US" sz="11500" dirty="0">
                 <a:hlinkClick r:id="rId3"/>
               </a:rPr>
-              <a:t>https://replit.com/@HylandOutreach/ButtonExample</a:t>
+              <a:t>https://jsfiddle.net/</a:t>
+            </a:r>
+            <a:r>
+              <a:rPr lang="en-US" sz="11500">
+                <a:hlinkClick r:id="rId3"/>
+              </a:rPr>
+              <a:t>a17tmcfn/</a:t>
             </a:r>
             <a:endParaRPr lang="en-US" sz="16600" dirty="0"/>
           </a:p>

</xml_diff>

<commit_message>
Update gitbook 2025-08-14 15:31:48
</commit_message>
<xml_diff>
--- a/Buttons/Buttons.pptx
+++ b/Buttons/Buttons.pptx
@@ -5,7 +5,7 @@
     <p:sldMasterId id="2147483648" r:id="rId1"/>
   </p:sldMasterIdLst>
   <p:notesMasterIdLst>
-    <p:notesMasterId r:id="rId13"/>
+    <p:notesMasterId r:id="rId12"/>
   </p:notesMasterIdLst>
   <p:sldIdLst>
     <p:sldId id="258" r:id="rId2"/>
@@ -16,9 +16,8 @@
     <p:sldId id="311" r:id="rId7"/>
     <p:sldId id="313" r:id="rId8"/>
     <p:sldId id="315" r:id="rId9"/>
-    <p:sldId id="312" r:id="rId10"/>
-    <p:sldId id="314" r:id="rId11"/>
-    <p:sldId id="317" r:id="rId12"/>
+    <p:sldId id="314" r:id="rId10"/>
+    <p:sldId id="317" r:id="rId11"/>
   </p:sldIdLst>
   <p:sldSz cx="12192000" cy="6858000"/>
   <p:notesSz cx="6858000" cy="9144000"/>
@@ -218,7 +217,7 @@
           <a:p>
             <a:fld id="{19104133-B5B0-4351-8158-4F0E5EB1E2BF}" type="datetimeFigureOut">
               <a:rPr lang="en-US" smtClean="0"/>
-              <a:t>9/4/2024</a:t>
+              <a:t>8/6/2025</a:t>
             </a:fld>
             <a:endParaRPr lang="en-US"/>
           </a:p>
@@ -560,279 +559,6 @@
     <p:extLst>
       <p:ext uri="{BB962C8B-B14F-4D97-AF65-F5344CB8AC3E}">
         <p14:creationId xmlns:p14="http://schemas.microsoft.com/office/powerpoint/2010/main" val="3737055910"/>
-      </p:ext>
-    </p:extLst>
-  </p:cSld>
-  <p:clrMapOvr>
-    <a:masterClrMapping/>
-  </p:clrMapOvr>
-</p:notes>
-</file>
-
-<file path=ppt/notesSlides/notesSlide10.xml><?xml version="1.0" encoding="utf-8"?>
-<p:notes xmlns:a="http://schemas.openxmlformats.org/drawingml/2006/main" xmlns:r="http://schemas.openxmlformats.org/officeDocument/2006/relationships" xmlns:p="http://schemas.openxmlformats.org/presentationml/2006/main">
-  <p:cSld>
-    <p:spTree>
-      <p:nvGrpSpPr>
-        <p:cNvPr id="1" name=""/>
-        <p:cNvGrpSpPr/>
-        <p:nvPr/>
-      </p:nvGrpSpPr>
-      <p:grpSpPr>
-        <a:xfrm>
-          <a:off x="0" y="0"/>
-          <a:ext cx="0" cy="0"/>
-          <a:chOff x="0" y="0"/>
-          <a:chExt cx="0" cy="0"/>
-        </a:xfrm>
-      </p:grpSpPr>
-      <p:sp>
-        <p:nvSpPr>
-          <p:cNvPr id="2" name="Slide Image Placeholder 1"/>
-          <p:cNvSpPr>
-            <a:spLocks noGrp="1" noRot="1" noChangeAspect="1"/>
-          </p:cNvSpPr>
-          <p:nvPr>
-            <p:ph type="sldImg"/>
-          </p:nvPr>
-        </p:nvSpPr>
-        <p:spPr/>
-      </p:sp>
-      <p:sp>
-        <p:nvSpPr>
-          <p:cNvPr id="3" name="Notes Placeholder 2"/>
-          <p:cNvSpPr>
-            <a:spLocks noGrp="1"/>
-          </p:cNvSpPr>
-          <p:nvPr>
-            <p:ph type="body" idx="1"/>
-          </p:nvPr>
-        </p:nvSpPr>
-        <p:spPr/>
-        <p:txBody>
-          <a:bodyPr/>
-          <a:lstStyle/>
-          <a:p>
-            <a:r>
-              <a:rPr lang="en-US" dirty="0"/>
-              <a:t>For the </a:t>
-            </a:r>
-            <a:r>
-              <a:rPr lang="en-US" dirty="0" err="1"/>
-              <a:t>Repl</a:t>
-            </a:r>
-            <a:r>
-              <a:rPr lang="en-US" dirty="0"/>
-              <a:t>,</a:t>
-            </a:r>
-            <a:r>
-              <a:rPr lang="en-US" baseline="0" dirty="0"/>
-              <a:t> note the following in the </a:t>
-            </a:r>
-            <a:r>
-              <a:rPr lang="en-US" b="1" baseline="0" dirty="0"/>
-              <a:t>index.html</a:t>
-            </a:r>
-            <a:r>
-              <a:rPr lang="en-US" b="0" baseline="0" dirty="0"/>
-              <a:t> file:</a:t>
-            </a:r>
-            <a:endParaRPr lang="en-US" baseline="0" dirty="0"/>
-          </a:p>
-          <a:p>
-            <a:pPr marL="171450" indent="-171450">
-              <a:buFontTx/>
-              <a:buChar char="-"/>
-            </a:pPr>
-            <a:r>
-              <a:rPr lang="en-US" baseline="0" dirty="0"/>
-              <a:t>The </a:t>
-            </a:r>
-            <a:r>
-              <a:rPr lang="en-US" b="1" baseline="0" dirty="0"/>
-              <a:t>script</a:t>
-            </a:r>
-            <a:r>
-              <a:rPr lang="en-US" b="0" baseline="0" dirty="0"/>
-              <a:t> tag has the proper </a:t>
-            </a:r>
-            <a:r>
-              <a:rPr lang="en-US" b="1" baseline="0" dirty="0" err="1"/>
-              <a:t>src</a:t>
-            </a:r>
-            <a:r>
-              <a:rPr lang="en-US" b="0" baseline="0" dirty="0"/>
-              <a:t> attribute pointing to </a:t>
-            </a:r>
-            <a:r>
-              <a:rPr lang="en-US" b="1" baseline="0" dirty="0"/>
-              <a:t>script.js</a:t>
-            </a:r>
-            <a:endParaRPr lang="en-US" b="0" baseline="0" dirty="0"/>
-          </a:p>
-          <a:p>
-            <a:pPr marL="171450" indent="-171450">
-              <a:buFontTx/>
-              <a:buChar char="-"/>
-            </a:pPr>
-            <a:r>
-              <a:rPr lang="en-US" b="0" baseline="0" dirty="0"/>
-              <a:t>The </a:t>
-            </a:r>
-            <a:r>
-              <a:rPr lang="en-US" b="1" baseline="0" dirty="0"/>
-              <a:t>button</a:t>
-            </a:r>
-            <a:r>
-              <a:rPr lang="en-US" b="0" baseline="0" dirty="0"/>
-              <a:t> tag has text of “Greet”</a:t>
-            </a:r>
-          </a:p>
-          <a:p>
-            <a:pPr marL="171450" indent="-171450">
-              <a:buFontTx/>
-              <a:buChar char="-"/>
-            </a:pPr>
-            <a:r>
-              <a:rPr lang="en-US" b="0" baseline="0" dirty="0"/>
-              <a:t>The </a:t>
-            </a:r>
-            <a:r>
-              <a:rPr lang="en-US" b="1" baseline="0" dirty="0"/>
-              <a:t>button</a:t>
-            </a:r>
-            <a:r>
-              <a:rPr lang="en-US" b="0" baseline="0" dirty="0"/>
-              <a:t> tag has the proper </a:t>
-            </a:r>
-            <a:r>
-              <a:rPr lang="en-US" b="1" baseline="0" dirty="0" err="1"/>
-              <a:t>onclick</a:t>
-            </a:r>
-            <a:r>
-              <a:rPr lang="en-US" b="0" baseline="0" dirty="0"/>
-              <a:t> attribute calling the </a:t>
-            </a:r>
-            <a:r>
-              <a:rPr lang="en-US" b="1" baseline="0" dirty="0" err="1"/>
-              <a:t>sayHello</a:t>
-            </a:r>
-            <a:r>
-              <a:rPr lang="en-US" b="0" baseline="0" dirty="0"/>
-              <a:t> function</a:t>
-            </a:r>
-          </a:p>
-          <a:p>
-            <a:pPr marL="171450" indent="-171450">
-              <a:buFontTx/>
-              <a:buChar char="-"/>
-            </a:pPr>
-            <a:endParaRPr lang="en-US" b="0" baseline="0" dirty="0"/>
-          </a:p>
-          <a:p>
-            <a:pPr marL="0" indent="0">
-              <a:buFontTx/>
-              <a:buNone/>
-            </a:pPr>
-            <a:r>
-              <a:rPr lang="en-US" b="0" baseline="0" dirty="0"/>
-              <a:t>Furthermore, note the following in the </a:t>
-            </a:r>
-            <a:r>
-              <a:rPr lang="en-US" b="1" baseline="0" dirty="0"/>
-              <a:t>script.js</a:t>
-            </a:r>
-            <a:r>
-              <a:rPr lang="en-US" b="0" baseline="0" dirty="0"/>
-              <a:t> file:</a:t>
-            </a:r>
-          </a:p>
-          <a:p>
-            <a:pPr marL="171450" indent="-171450">
-              <a:buFontTx/>
-              <a:buChar char="-"/>
-            </a:pPr>
-            <a:r>
-              <a:rPr lang="en-US" b="0" baseline="0" dirty="0"/>
-              <a:t>The function name is </a:t>
-            </a:r>
-            <a:r>
-              <a:rPr lang="en-US" b="1" baseline="0" dirty="0" err="1"/>
-              <a:t>sayHello</a:t>
-            </a:r>
-            <a:endParaRPr lang="en-US" b="0" baseline="0" dirty="0"/>
-          </a:p>
-          <a:p>
-            <a:pPr marL="171450" indent="-171450">
-              <a:buFontTx/>
-              <a:buChar char="-"/>
-            </a:pPr>
-            <a:r>
-              <a:rPr lang="en-US" b="0" baseline="0" dirty="0"/>
-              <a:t>There are two</a:t>
-            </a:r>
-            <a:r>
-              <a:rPr lang="en-US" b="1" baseline="0" dirty="0"/>
-              <a:t> alert</a:t>
-            </a:r>
-            <a:r>
-              <a:rPr lang="en-US" b="0" baseline="0" dirty="0"/>
-              <a:t> statements in the body of the function</a:t>
-            </a:r>
-          </a:p>
-          <a:p>
-            <a:pPr marL="0" indent="0">
-              <a:buFontTx/>
-              <a:buNone/>
-            </a:pPr>
-            <a:endParaRPr lang="en-US" b="0" baseline="0" dirty="0"/>
-          </a:p>
-          <a:p>
-            <a:pPr marL="0" indent="0">
-              <a:buFontTx/>
-              <a:buNone/>
-            </a:pPr>
-            <a:r>
-              <a:rPr lang="en-US" b="0" baseline="0" dirty="0"/>
-              <a:t>Throughout, note the syntax of each piece of the code.</a:t>
-            </a:r>
-          </a:p>
-          <a:p>
-            <a:pPr marL="171450" indent="-171450">
-              <a:buFontTx/>
-              <a:buChar char="-"/>
-            </a:pPr>
-            <a:endParaRPr lang="en-US" baseline="0" dirty="0"/>
-          </a:p>
-        </p:txBody>
-      </p:sp>
-      <p:sp>
-        <p:nvSpPr>
-          <p:cNvPr id="4" name="Slide Number Placeholder 3"/>
-          <p:cNvSpPr>
-            <a:spLocks noGrp="1"/>
-          </p:cNvSpPr>
-          <p:nvPr>
-            <p:ph type="sldNum" sz="quarter" idx="10"/>
-          </p:nvPr>
-        </p:nvSpPr>
-        <p:spPr/>
-        <p:txBody>
-          <a:bodyPr/>
-          <a:lstStyle/>
-          <a:p>
-            <a:fld id="{DEC8F7F9-57EC-49CF-9FCD-2B781E4B449F}" type="slidenum">
-              <a:rPr lang="en-US" smtClean="0"/>
-              <a:t>10</a:t>
-            </a:fld>
-            <a:endParaRPr lang="en-US"/>
-          </a:p>
-        </p:txBody>
-      </p:sp>
-    </p:spTree>
-    <p:extLst>
-      <p:ext uri="{BB962C8B-B14F-4D97-AF65-F5344CB8AC3E}">
-        <p14:creationId xmlns:p14="http://schemas.microsoft.com/office/powerpoint/2010/main" val="3196260883"/>
       </p:ext>
     </p:extLst>
   </p:cSld>
@@ -1735,22 +1461,194 @@
           <a:p>
             <a:r>
               <a:rPr lang="en-US" dirty="0"/>
-              <a:t>Explain</a:t>
+              <a:t>For the </a:t>
+            </a:r>
+            <a:r>
+              <a:rPr lang="en-US" dirty="0" err="1"/>
+              <a:t>Repl</a:t>
+            </a:r>
+            <a:r>
+              <a:rPr lang="en-US" dirty="0"/>
+              <a:t>,</a:t>
             </a:r>
             <a:r>
               <a:rPr lang="en-US" baseline="0" dirty="0"/>
-              <a:t> a little bit of background on functions.</a:t>
+              <a:t> note the following in the </a:t>
+            </a:r>
+            <a:r>
+              <a:rPr lang="en-US" b="1" baseline="0" dirty="0"/>
+              <a:t>index.html</a:t>
+            </a:r>
+            <a:r>
+              <a:rPr lang="en-US" b="0" baseline="0" dirty="0"/>
+              <a:t> file:</a:t>
+            </a:r>
+            <a:endParaRPr lang="en-US" baseline="0" dirty="0"/>
+          </a:p>
+          <a:p>
+            <a:pPr marL="171450" indent="-171450">
+              <a:buFontTx/>
+              <a:buChar char="-"/>
+            </a:pPr>
+            <a:r>
+              <a:rPr lang="en-US" baseline="0" dirty="0"/>
+              <a:t>The </a:t>
+            </a:r>
+            <a:r>
+              <a:rPr lang="en-US" b="1" baseline="0" dirty="0"/>
+              <a:t>script</a:t>
+            </a:r>
+            <a:r>
+              <a:rPr lang="en-US" b="0" baseline="0" dirty="0"/>
+              <a:t> tag has the proper </a:t>
+            </a:r>
+            <a:r>
+              <a:rPr lang="en-US" b="1" baseline="0" dirty="0" err="1"/>
+              <a:t>src</a:t>
+            </a:r>
+            <a:r>
+              <a:rPr lang="en-US" b="0" baseline="0" dirty="0"/>
+              <a:t> attribute pointing to </a:t>
+            </a:r>
+            <a:r>
+              <a:rPr lang="en-US" b="1" baseline="0" dirty="0"/>
+              <a:t>script.js</a:t>
+            </a:r>
+            <a:endParaRPr lang="en-US" b="0" baseline="0" dirty="0"/>
+          </a:p>
+          <a:p>
+            <a:pPr marL="171450" indent="-171450">
+              <a:buFontTx/>
+              <a:buChar char="-"/>
+            </a:pPr>
+            <a:r>
+              <a:rPr lang="en-US" b="0" baseline="0" dirty="0"/>
+              <a:t>The </a:t>
+            </a:r>
+            <a:r>
+              <a:rPr lang="en-US" b="1" baseline="0" dirty="0"/>
+              <a:t>button</a:t>
+            </a:r>
+            <a:r>
+              <a:rPr lang="en-US" b="0" baseline="0" dirty="0"/>
+              <a:t> tag has text of “Greet”</a:t>
             </a:r>
           </a:p>
           <a:p>
-            <a:endParaRPr lang="en-US" baseline="0" dirty="0"/>
+            <a:pPr marL="171450" indent="-171450">
+              <a:buFontTx/>
+              <a:buChar char="-"/>
+            </a:pPr>
+            <a:r>
+              <a:rPr lang="en-US" b="0" baseline="0" dirty="0"/>
+              <a:t>The </a:t>
+            </a:r>
+            <a:r>
+              <a:rPr lang="en-US" b="1" baseline="0" dirty="0"/>
+              <a:t>button</a:t>
+            </a:r>
+            <a:r>
+              <a:rPr lang="en-US" b="0" baseline="0" dirty="0"/>
+              <a:t> tag has the proper </a:t>
+            </a:r>
+            <a:r>
+              <a:rPr lang="en-US" b="1" baseline="0" dirty="0" err="1"/>
+              <a:t>onclick</a:t>
+            </a:r>
+            <a:r>
+              <a:rPr lang="en-US" b="0" baseline="0" dirty="0"/>
+              <a:t> attribute calling the </a:t>
+            </a:r>
+            <a:r>
+              <a:rPr lang="en-US" b="1" baseline="0" dirty="0" err="1"/>
+              <a:t>sayHello</a:t>
+            </a:r>
+            <a:r>
+              <a:rPr lang="en-US" b="0" baseline="0" dirty="0"/>
+              <a:t> function</a:t>
+            </a:r>
           </a:p>
           <a:p>
+            <a:pPr marL="171450" indent="-171450">
+              <a:buFontTx/>
+              <a:buChar char="-"/>
+            </a:pPr>
+            <a:endParaRPr lang="en-US" b="0" baseline="0" dirty="0"/>
+          </a:p>
+          <a:p>
+            <a:pPr marL="0" indent="0">
+              <a:buFontTx/>
+              <a:buNone/>
+            </a:pPr>
             <a:r>
-              <a:rPr lang="en-US" i="1" baseline="0" dirty="0"/>
-              <a:t>Note that the goal here is not to make the students understand functions. They only need to understand enough to use functions for their webpages.</a:t>
+              <a:rPr lang="en-US" b="0" baseline="0" dirty="0"/>
+              <a:t>Furthermore, note the following in the </a:t>
             </a:r>
-            <a:endParaRPr lang="en-US" i="1" dirty="0"/>
+            <a:r>
+              <a:rPr lang="en-US" b="1" baseline="0" dirty="0"/>
+              <a:t>script.js</a:t>
+            </a:r>
+            <a:r>
+              <a:rPr lang="en-US" b="0" baseline="0" dirty="0"/>
+              <a:t> file:</a:t>
+            </a:r>
+          </a:p>
+          <a:p>
+            <a:pPr marL="171450" indent="-171450">
+              <a:buFontTx/>
+              <a:buChar char="-"/>
+            </a:pPr>
+            <a:r>
+              <a:rPr lang="en-US" b="0" baseline="0" dirty="0"/>
+              <a:t>The function name is </a:t>
+            </a:r>
+            <a:r>
+              <a:rPr lang="en-US" b="1" baseline="0" dirty="0" err="1"/>
+              <a:t>sayHello</a:t>
+            </a:r>
+            <a:endParaRPr lang="en-US" b="0" baseline="0" dirty="0"/>
+          </a:p>
+          <a:p>
+            <a:pPr marL="171450" indent="-171450">
+              <a:buFontTx/>
+              <a:buChar char="-"/>
+            </a:pPr>
+            <a:r>
+              <a:rPr lang="en-US" b="0" baseline="0" dirty="0"/>
+              <a:t>There are two</a:t>
+            </a:r>
+            <a:r>
+              <a:rPr lang="en-US" b="1" baseline="0" dirty="0"/>
+              <a:t> alert</a:t>
+            </a:r>
+            <a:r>
+              <a:rPr lang="en-US" b="0" baseline="0" dirty="0"/>
+              <a:t> statements in the body of the function</a:t>
+            </a:r>
+          </a:p>
+          <a:p>
+            <a:pPr marL="0" indent="0">
+              <a:buFontTx/>
+              <a:buNone/>
+            </a:pPr>
+            <a:endParaRPr lang="en-US" b="0" baseline="0" dirty="0"/>
+          </a:p>
+          <a:p>
+            <a:pPr marL="0" indent="0">
+              <a:buFontTx/>
+              <a:buNone/>
+            </a:pPr>
+            <a:r>
+              <a:rPr lang="en-US" b="0" baseline="0" dirty="0"/>
+              <a:t>Throughout, note the syntax of each piece of the code.</a:t>
+            </a:r>
+          </a:p>
+          <a:p>
+            <a:pPr marL="171450" indent="-171450">
+              <a:buFontTx/>
+              <a:buChar char="-"/>
+            </a:pPr>
+            <a:endParaRPr lang="en-US" baseline="0" dirty="0"/>
           </a:p>
         </p:txBody>
       </p:sp>
@@ -1780,7 +1678,7 @@
     </p:spTree>
     <p:extLst>
       <p:ext uri="{BB962C8B-B14F-4D97-AF65-F5344CB8AC3E}">
-        <p14:creationId xmlns:p14="http://schemas.microsoft.com/office/powerpoint/2010/main" val="2236715725"/>
+        <p14:creationId xmlns:p14="http://schemas.microsoft.com/office/powerpoint/2010/main" val="3196260883"/>
       </p:ext>
     </p:extLst>
   </p:cSld>
@@ -1972,7 +1870,7 @@
             <a:fld id="{1C2D31DE-C454-491C-B5C3-F097855E3DF7}" type="datetime4">
               <a:rPr lang="en-US" smtClean="0"/>
               <a:pPr/>
-              <a:t>September 4, 2024</a:t>
+              <a:t>August 6, 2025</a:t>
             </a:fld>
             <a:endParaRPr lang="en-US" dirty="0"/>
           </a:p>
@@ -5364,7 +5262,7 @@
           <a:p>
             <a:fld id="{5958763E-B898-436D-883D-03711491D54A}" type="datetimeFigureOut">
               <a:rPr lang="en-US" smtClean="0"/>
-              <a:t>9/4/2024</a:t>
+              <a:t>8/6/2025</a:t>
             </a:fld>
             <a:endParaRPr lang="en-US"/>
           </a:p>
@@ -5557,7 +5455,7 @@
           <a:p>
             <a:fld id="{5958763E-B898-436D-883D-03711491D54A}" type="datetimeFigureOut">
               <a:rPr lang="en-US" smtClean="0"/>
-              <a:t>9/4/2024</a:t>
+              <a:t>8/6/2025</a:t>
             </a:fld>
             <a:endParaRPr lang="en-US"/>
           </a:p>
@@ -5807,7 +5705,7 @@
           <a:p>
             <a:fld id="{5958763E-B898-436D-883D-03711491D54A}" type="datetimeFigureOut">
               <a:rPr lang="en-US" smtClean="0"/>
-              <a:t>9/4/2024</a:t>
+              <a:t>8/6/2025</a:t>
             </a:fld>
             <a:endParaRPr lang="en-US"/>
           </a:p>
@@ -6155,7 +6053,7 @@
           <a:p>
             <a:fld id="{5958763E-B898-436D-883D-03711491D54A}" type="datetimeFigureOut">
               <a:rPr lang="en-US" smtClean="0"/>
-              <a:t>9/4/2024</a:t>
+              <a:t>8/6/2025</a:t>
             </a:fld>
             <a:endParaRPr lang="en-US"/>
           </a:p>
@@ -6571,7 +6469,7 @@
           <a:p>
             <a:fld id="{5958763E-B898-436D-883D-03711491D54A}" type="datetimeFigureOut">
               <a:rPr lang="en-US" smtClean="0"/>
-              <a:t>9/4/2024</a:t>
+              <a:t>8/6/2025</a:t>
             </a:fld>
             <a:endParaRPr lang="en-US"/>
           </a:p>
@@ -7072,7 +6970,7 @@
           <a:p>
             <a:fld id="{5958763E-B898-436D-883D-03711491D54A}" type="datetimeFigureOut">
               <a:rPr lang="en-US" smtClean="0"/>
-              <a:t>9/4/2024</a:t>
+              <a:t>8/6/2025</a:t>
             </a:fld>
             <a:endParaRPr lang="en-US"/>
           </a:p>
@@ -7523,7 +7421,7 @@
           <a:p>
             <a:fld id="{5958763E-B898-436D-883D-03711491D54A}" type="datetimeFigureOut">
               <a:rPr lang="en-US" smtClean="0"/>
-              <a:t>9/4/2024</a:t>
+              <a:t>8/6/2025</a:t>
             </a:fld>
             <a:endParaRPr lang="en-US"/>
           </a:p>
@@ -8134,7 +8032,7 @@
           <a:p>
             <a:fld id="{5958763E-B898-436D-883D-03711491D54A}" type="datetimeFigureOut">
               <a:rPr lang="en-US" smtClean="0"/>
-              <a:t>9/4/2024</a:t>
+              <a:t>8/6/2025</a:t>
             </a:fld>
             <a:endParaRPr lang="en-US"/>
           </a:p>
@@ -8905,7 +8803,7 @@
           <a:p>
             <a:fld id="{5958763E-B898-436D-883D-03711491D54A}" type="datetimeFigureOut">
               <a:rPr lang="en-US" smtClean="0"/>
-              <a:t>9/4/2024</a:t>
+              <a:t>8/6/2025</a:t>
             </a:fld>
             <a:endParaRPr lang="en-US"/>
           </a:p>
@@ -9009,7 +8907,7 @@
           <a:p>
             <a:fld id="{5958763E-B898-436D-883D-03711491D54A}" type="datetimeFigureOut">
               <a:rPr lang="en-US" smtClean="0"/>
-              <a:t>9/4/2024</a:t>
+              <a:t>8/6/2025</a:t>
             </a:fld>
             <a:endParaRPr lang="en-US"/>
           </a:p>
@@ -9336,7 +9234,7 @@
             <a:fld id="{1C2D31DE-C454-491C-B5C3-F097855E3DF7}" type="datetime4">
               <a:rPr lang="en-US" smtClean="0"/>
               <a:pPr/>
-              <a:t>September 4, 2024</a:t>
+              <a:t>August 6, 2025</a:t>
             </a:fld>
             <a:endParaRPr lang="en-US" dirty="0"/>
           </a:p>
@@ -12488,7 +12386,7 @@
           <a:p>
             <a:fld id="{5958763E-B898-436D-883D-03711491D54A}" type="datetimeFigureOut">
               <a:rPr lang="en-US" smtClean="0"/>
-              <a:t>9/4/2024</a:t>
+              <a:t>8/6/2025</a:t>
             </a:fld>
             <a:endParaRPr lang="en-US"/>
           </a:p>
@@ -12612,7 +12510,7 @@
           <a:p>
             <a:fld id="{5958763E-B898-436D-883D-03711491D54A}" type="datetimeFigureOut">
               <a:rPr lang="en-US" smtClean="0"/>
-              <a:t>9/4/2024</a:t>
+              <a:t>8/6/2025</a:t>
             </a:fld>
             <a:endParaRPr lang="en-US"/>
           </a:p>
@@ -12736,7 +12634,7 @@
           <a:p>
             <a:fld id="{5958763E-B898-436D-883D-03711491D54A}" type="datetimeFigureOut">
               <a:rPr lang="en-US" smtClean="0"/>
-              <a:t>9/4/2024</a:t>
+              <a:t>8/6/2025</a:t>
             </a:fld>
             <a:endParaRPr lang="en-US"/>
           </a:p>
@@ -12860,7 +12758,7 @@
           <a:p>
             <a:fld id="{5958763E-B898-436D-883D-03711491D54A}" type="datetimeFigureOut">
               <a:rPr lang="en-US" smtClean="0"/>
-              <a:t>9/4/2024</a:t>
+              <a:t>8/6/2025</a:t>
             </a:fld>
             <a:endParaRPr lang="en-US"/>
           </a:p>
@@ -12984,7 +12882,7 @@
           <a:p>
             <a:fld id="{5958763E-B898-436D-883D-03711491D54A}" type="datetimeFigureOut">
               <a:rPr lang="en-US" smtClean="0"/>
-              <a:t>9/4/2024</a:t>
+              <a:t>8/6/2025</a:t>
             </a:fld>
             <a:endParaRPr lang="en-US"/>
           </a:p>
@@ -13108,7 +13006,7 @@
           <a:p>
             <a:fld id="{5958763E-B898-436D-883D-03711491D54A}" type="datetimeFigureOut">
               <a:rPr lang="en-US" smtClean="0"/>
-              <a:t>9/4/2024</a:t>
+              <a:t>8/6/2025</a:t>
             </a:fld>
             <a:endParaRPr lang="en-US"/>
           </a:p>
@@ -13232,7 +13130,7 @@
           <a:p>
             <a:fld id="{5958763E-B898-436D-883D-03711491D54A}" type="datetimeFigureOut">
               <a:rPr lang="en-US" smtClean="0"/>
-              <a:t>9/4/2024</a:t>
+              <a:t>8/6/2025</a:t>
             </a:fld>
             <a:endParaRPr lang="en-US"/>
           </a:p>
@@ -13356,7 +13254,7 @@
           <a:p>
             <a:fld id="{5958763E-B898-436D-883D-03711491D54A}" type="datetimeFigureOut">
               <a:rPr lang="en-US" smtClean="0"/>
-              <a:t>9/4/2024</a:t>
+              <a:t>8/6/2025</a:t>
             </a:fld>
             <a:endParaRPr lang="en-US"/>
           </a:p>
@@ -13489,7 +13387,7 @@
           <a:p>
             <a:fld id="{5958763E-B898-436D-883D-03711491D54A}" type="datetimeFigureOut">
               <a:rPr lang="en-US" smtClean="0"/>
-              <a:t>9/4/2024</a:t>
+              <a:t>8/6/2025</a:t>
             </a:fld>
             <a:endParaRPr lang="en-US"/>
           </a:p>
@@ -16828,7 +16726,7 @@
             <a:fld id="{1C2D31DE-C454-491C-B5C3-F097855E3DF7}" type="datetime4">
               <a:rPr lang="en-US" smtClean="0"/>
               <a:pPr/>
-              <a:t>September 4, 2024</a:t>
+              <a:t>August 6, 2025</a:t>
             </a:fld>
             <a:endParaRPr lang="en-US" dirty="0"/>
           </a:p>
@@ -29064,7 +28962,7 @@
           <a:p>
             <a:fld id="{5958763E-B898-436D-883D-03711491D54A}" type="datetimeFigureOut">
               <a:rPr lang="en-US" smtClean="0"/>
-              <a:t>9/4/2024</a:t>
+              <a:t>8/6/2025</a:t>
             </a:fld>
             <a:endParaRPr lang="en-US"/>
           </a:p>
@@ -29466,7 +29364,7 @@
           <a:p>
             <a:fld id="{5958763E-B898-436D-883D-03711491D54A}" type="datetimeFigureOut">
               <a:rPr lang="en-US" smtClean="0"/>
-              <a:t>9/4/2024</a:t>
+              <a:t>8/6/2025</a:t>
             </a:fld>
             <a:endParaRPr lang="en-US"/>
           </a:p>
@@ -29760,7 +29658,7 @@
           <a:p>
             <a:fld id="{5958763E-B898-436D-883D-03711491D54A}" type="datetimeFigureOut">
               <a:rPr lang="en-US" smtClean="0"/>
-              <a:t>9/4/2024</a:t>
+              <a:t>8/6/2025</a:t>
             </a:fld>
             <a:endParaRPr lang="en-US"/>
           </a:p>
@@ -29961,7 +29859,7 @@
           <a:p>
             <a:fld id="{5958763E-B898-436D-883D-03711491D54A}" type="datetimeFigureOut">
               <a:rPr lang="en-US" smtClean="0"/>
-              <a:t>9/4/2024</a:t>
+              <a:t>8/6/2025</a:t>
             </a:fld>
             <a:endParaRPr lang="en-US"/>
           </a:p>
@@ -30222,7 +30120,7 @@
           <a:p>
             <a:fld id="{5958763E-B898-436D-883D-03711491D54A}" type="datetimeFigureOut">
               <a:rPr lang="en-US" smtClean="0"/>
-              <a:t>9/4/2024</a:t>
+              <a:t>8/6/2025</a:t>
             </a:fld>
             <a:endParaRPr lang="en-US"/>
           </a:p>
@@ -30730,7 +30628,7 @@
           <a:p>
             <a:fld id="{5958763E-B898-436D-883D-03711491D54A}" type="datetimeFigureOut">
               <a:rPr lang="en-US" smtClean="0"/>
-              <a:t>9/4/2024</a:t>
+              <a:t>8/6/2025</a:t>
             </a:fld>
             <a:endParaRPr lang="en-US"/>
           </a:p>
@@ -31209,7 +31107,7 @@
           <a:p>
             <a:fld id="{5958763E-B898-436D-883D-03711491D54A}" type="datetimeFigureOut">
               <a:rPr lang="en-US" smtClean="0"/>
-              <a:t>9/4/2024</a:t>
+              <a:t>8/6/2025</a:t>
             </a:fld>
             <a:endParaRPr lang="en-US"/>
           </a:p>
@@ -32028,7 +31926,7 @@
           <a:p>
             <a:fld id="{5958763E-B898-436D-883D-03711491D54A}" type="datetimeFigureOut">
               <a:rPr lang="en-US" smtClean="0"/>
-              <a:t>9/4/2024</a:t>
+              <a:t>8/6/2025</a:t>
             </a:fld>
             <a:endParaRPr lang="en-US"/>
           </a:p>
@@ -32229,7 +32127,7 @@
           <a:p>
             <a:fld id="{5958763E-B898-436D-883D-03711491D54A}" type="datetimeFigureOut">
               <a:rPr lang="en-US" smtClean="0"/>
-              <a:t>9/4/2024</a:t>
+              <a:t>8/6/2025</a:t>
             </a:fld>
             <a:endParaRPr lang="en-US"/>
           </a:p>
@@ -32564,7 +32462,7 @@
           <a:p>
             <a:fld id="{5958763E-B898-436D-883D-03711491D54A}" type="datetimeFigureOut">
               <a:rPr lang="en-US" smtClean="0"/>
-              <a:t>9/4/2024</a:t>
+              <a:t>8/6/2025</a:t>
             </a:fld>
             <a:endParaRPr lang="en-US"/>
           </a:p>
@@ -32794,7 +32692,7 @@
           <a:p>
             <a:fld id="{5958763E-B898-436D-883D-03711491D54A}" type="datetimeFigureOut">
               <a:rPr lang="en-US" smtClean="0"/>
-              <a:t>9/4/2024</a:t>
+              <a:t>8/6/2025</a:t>
             </a:fld>
             <a:endParaRPr lang="en-US"/>
           </a:p>
@@ -33038,7 +32936,7 @@
           <a:p>
             <a:fld id="{5958763E-B898-436D-883D-03711491D54A}" type="datetimeFigureOut">
               <a:rPr lang="en-US" smtClean="0"/>
-              <a:t>9/4/2024</a:t>
+              <a:t>8/6/2025</a:t>
             </a:fld>
             <a:endParaRPr lang="en-US"/>
           </a:p>
@@ -33568,7 +33466,7 @@
           <a:p>
             <a:r>
               <a:rPr lang="en-US" sz="6600" dirty="0"/>
-              <a:t>Buttons &amp; Functions</a:t>
+              <a:t>Buttons</a:t>
             </a:r>
           </a:p>
         </p:txBody>
@@ -36590,107 +36488,6 @@
 </file>
 
 <file path=ppt/slides/slide10.xml><?xml version="1.0" encoding="utf-8"?>
-<p:sld xmlns:a="http://schemas.openxmlformats.org/drawingml/2006/main" xmlns:r="http://schemas.openxmlformats.org/officeDocument/2006/relationships" xmlns:p="http://schemas.openxmlformats.org/presentationml/2006/main">
-  <p:cSld>
-    <p:bg>
-      <p:bgPr>
-        <a:solidFill>
-          <a:schemeClr val="tx1">
-            <a:lumMod val="50000"/>
-          </a:schemeClr>
-        </a:solidFill>
-        <a:effectLst/>
-      </p:bgPr>
-    </p:bg>
-    <p:spTree>
-      <p:nvGrpSpPr>
-        <p:cNvPr id="1" name=""/>
-        <p:cNvGrpSpPr/>
-        <p:nvPr/>
-      </p:nvGrpSpPr>
-      <p:grpSpPr>
-        <a:xfrm>
-          <a:off x="0" y="0"/>
-          <a:ext cx="0" cy="0"/>
-          <a:chOff x="0" y="0"/>
-          <a:chExt cx="0" cy="0"/>
-        </a:xfrm>
-      </p:grpSpPr>
-      <p:sp>
-        <p:nvSpPr>
-          <p:cNvPr id="2" name="Title 1"/>
-          <p:cNvSpPr>
-            <a:spLocks noGrp="1"/>
-          </p:cNvSpPr>
-          <p:nvPr>
-            <p:ph type="title"/>
-          </p:nvPr>
-        </p:nvSpPr>
-        <p:spPr/>
-        <p:txBody>
-          <a:bodyPr/>
-          <a:lstStyle/>
-          <a:p>
-            <a:r>
-              <a:rPr lang="en-US" dirty="0"/>
-              <a:t>Button example</a:t>
-            </a:r>
-          </a:p>
-        </p:txBody>
-      </p:sp>
-      <p:sp>
-        <p:nvSpPr>
-          <p:cNvPr id="3" name="Content Placeholder 2"/>
-          <p:cNvSpPr>
-            <a:spLocks noGrp="1"/>
-          </p:cNvSpPr>
-          <p:nvPr>
-            <p:ph idx="1"/>
-          </p:nvPr>
-        </p:nvSpPr>
-        <p:spPr/>
-        <p:txBody>
-          <a:bodyPr>
-            <a:noAutofit/>
-          </a:bodyPr>
-          <a:lstStyle/>
-          <a:p>
-            <a:pPr marL="57150" indent="0">
-              <a:buNone/>
-            </a:pPr>
-            <a:r>
-              <a:rPr lang="en-US" sz="11500" dirty="0">
-                <a:hlinkClick r:id="rId3"/>
-              </a:rPr>
-              <a:t>https://jsfiddle.net/</a:t>
-            </a:r>
-            <a:r>
-              <a:rPr lang="en-US" sz="11500">
-                <a:hlinkClick r:id="rId3"/>
-              </a:rPr>
-              <a:t>a17tmcfn/</a:t>
-            </a:r>
-            <a:endParaRPr lang="en-US" sz="16600" dirty="0"/>
-          </a:p>
-        </p:txBody>
-      </p:sp>
-    </p:spTree>
-    <p:extLst>
-      <p:ext uri="{BB962C8B-B14F-4D97-AF65-F5344CB8AC3E}">
-        <p14:creationId xmlns:p14="http://schemas.microsoft.com/office/powerpoint/2010/main" val="2737574763"/>
-      </p:ext>
-    </p:extLst>
-  </p:cSld>
-  <p:clrMapOvr>
-    <a:masterClrMapping/>
-  </p:clrMapOvr>
-  <p:transition>
-    <p:fade/>
-  </p:transition>
-</p:sld>
-</file>
-
-<file path=ppt/slides/slide11.xml><?xml version="1.0" encoding="utf-8"?>
 <p:sld xmlns:a="http://schemas.openxmlformats.org/drawingml/2006/main" xmlns:r="http://schemas.openxmlformats.org/officeDocument/2006/relationships" xmlns:p="http://schemas.openxmlformats.org/presentationml/2006/main">
   <p:cSld>
     <p:spTree>
@@ -40842,6 +40639,16 @@
 <file path=ppt/slides/slide9.xml><?xml version="1.0" encoding="utf-8"?>
 <p:sld xmlns:a="http://schemas.openxmlformats.org/drawingml/2006/main" xmlns:r="http://schemas.openxmlformats.org/officeDocument/2006/relationships" xmlns:p="http://schemas.openxmlformats.org/presentationml/2006/main">
   <p:cSld>
+    <p:bg>
+      <p:bgPr>
+        <a:solidFill>
+          <a:schemeClr val="tx1">
+            <a:lumMod val="50000"/>
+          </a:schemeClr>
+        </a:solidFill>
+        <a:effectLst/>
+      </p:bgPr>
+    </p:bg>
     <p:spTree>
       <p:nvGrpSpPr>
         <p:cNvPr id="1" name=""/>
@@ -40873,7 +40680,7 @@
           <a:p>
             <a:r>
               <a:rPr lang="en-US" dirty="0"/>
-              <a:t>Functions recap</a:t>
+              <a:t>Button example</a:t>
             </a:r>
           </a:p>
         </p:txBody>
@@ -40890,82 +40697,34 @@
         </p:nvSpPr>
         <p:spPr/>
         <p:txBody>
-          <a:bodyPr/>
+          <a:bodyPr>
+            <a:noAutofit/>
+          </a:bodyPr>
           <a:lstStyle/>
           <a:p>
-            <a:endParaRPr lang="en-US" dirty="0"/>
-          </a:p>
-          <a:p>
+            <a:pPr marL="57150" indent="0">
+              <a:buNone/>
+            </a:pPr>
             <a:r>
-              <a:rPr lang="en-US" dirty="0"/>
-              <a:t>When a button is clicked, it </a:t>
+              <a:rPr lang="en-US" sz="11500" dirty="0">
+                <a:hlinkClick r:id="rId3"/>
+              </a:rPr>
+              <a:t>https://jsfiddle.net/</a:t>
             </a:r>
             <a:r>
-              <a:rPr lang="en-US" i="1" dirty="0"/>
-              <a:t>calls</a:t>
+              <a:rPr lang="en-US" sz="11500">
+                <a:hlinkClick r:id="rId3"/>
+              </a:rPr>
+              <a:t>a17tmcfn/</a:t>
             </a:r>
-            <a:r>
-              <a:rPr lang="en-US" dirty="0"/>
-              <a:t> a </a:t>
-            </a:r>
-            <a:r>
-              <a:rPr lang="en-US" b="1" dirty="0"/>
-              <a:t>function</a:t>
-            </a:r>
-            <a:endParaRPr lang="en-US" dirty="0"/>
-          </a:p>
-          <a:p>
-            <a:r>
-              <a:rPr lang="en-US" dirty="0"/>
-              <a:t>Functions run specific blocks of code when called</a:t>
-            </a:r>
-          </a:p>
-          <a:p>
-            <a:endParaRPr lang="en-US" b="1" dirty="0"/>
-          </a:p>
-          <a:p>
-            <a:r>
-              <a:rPr lang="en-US" dirty="0"/>
-              <a:t>Functions can be </a:t>
-            </a:r>
-            <a:r>
-              <a:rPr lang="en-US" i="1" dirty="0"/>
-              <a:t>defined</a:t>
-            </a:r>
-            <a:r>
-              <a:rPr lang="en-US" dirty="0"/>
-              <a:t> in a </a:t>
-            </a:r>
-            <a:r>
-              <a:rPr lang="en-US" b="1" dirty="0"/>
-              <a:t>script.js</a:t>
-            </a:r>
-            <a:r>
-              <a:rPr lang="en-US" dirty="0"/>
-              <a:t> file</a:t>
-            </a:r>
-          </a:p>
-          <a:p>
-            <a:r>
-              <a:rPr lang="en-US" dirty="0"/>
-              <a:t>The function name in the definition must match the function call</a:t>
-            </a:r>
-          </a:p>
-          <a:p>
-            <a:endParaRPr lang="en-US" dirty="0"/>
-          </a:p>
-          <a:p>
-            <a:r>
-              <a:rPr lang="en-US" dirty="0"/>
-              <a:t>Functions can be difficult to understand – it takes a lot of practice!</a:t>
-            </a:r>
+            <a:endParaRPr lang="en-US" sz="16600" dirty="0"/>
           </a:p>
         </p:txBody>
       </p:sp>
     </p:spTree>
     <p:extLst>
       <p:ext uri="{BB962C8B-B14F-4D97-AF65-F5344CB8AC3E}">
-        <p14:creationId xmlns:p14="http://schemas.microsoft.com/office/powerpoint/2010/main" val="26363434"/>
+        <p14:creationId xmlns:p14="http://schemas.microsoft.com/office/powerpoint/2010/main" val="2737574763"/>
       </p:ext>
     </p:extLst>
   </p:cSld>
@@ -40975,344 +40734,6 @@
   <p:transition>
     <p:fade/>
   </p:transition>
-  <p:timing>
-    <p:tnLst>
-      <p:par>
-        <p:cTn id="1" dur="indefinite" restart="never" nodeType="tmRoot">
-          <p:childTnLst>
-            <p:seq concurrent="1" nextAc="seek">
-              <p:cTn id="2" dur="indefinite" nodeType="mainSeq">
-                <p:childTnLst>
-                  <p:par>
-                    <p:cTn id="3" fill="hold">
-                      <p:stCondLst>
-                        <p:cond delay="indefinite"/>
-                      </p:stCondLst>
-                      <p:childTnLst>
-                        <p:par>
-                          <p:cTn id="4" fill="hold">
-                            <p:stCondLst>
-                              <p:cond delay="0"/>
-                            </p:stCondLst>
-                            <p:childTnLst>
-                              <p:par>
-                                <p:cTn id="5" presetID="10" presetClass="entr" presetSubtype="0" fill="hold" grpId="0" nodeType="clickEffect">
-                                  <p:stCondLst>
-                                    <p:cond delay="0"/>
-                                  </p:stCondLst>
-                                  <p:childTnLst>
-                                    <p:set>
-                                      <p:cBhvr>
-                                        <p:cTn id="6" dur="1" fill="hold">
-                                          <p:stCondLst>
-                                            <p:cond delay="0"/>
-                                          </p:stCondLst>
-                                        </p:cTn>
-                                        <p:tgtEl>
-                                          <p:spTgt spid="3">
-                                            <p:txEl>
-                                              <p:pRg st="1" end="1"/>
-                                            </p:txEl>
-                                          </p:spTgt>
-                                        </p:tgtEl>
-                                        <p:attrNameLst>
-                                          <p:attrName>style.visibility</p:attrName>
-                                        </p:attrNameLst>
-                                      </p:cBhvr>
-                                      <p:to>
-                                        <p:strVal val="visible"/>
-                                      </p:to>
-                                    </p:set>
-                                    <p:animEffect transition="in" filter="fade">
-                                      <p:cBhvr>
-                                        <p:cTn id="7" dur="500"/>
-                                        <p:tgtEl>
-                                          <p:spTgt spid="3">
-                                            <p:txEl>
-                                              <p:pRg st="1" end="1"/>
-                                            </p:txEl>
-                                          </p:spTgt>
-                                        </p:tgtEl>
-                                      </p:cBhvr>
-                                    </p:animEffect>
-                                  </p:childTnLst>
-                                </p:cTn>
-                              </p:par>
-                            </p:childTnLst>
-                          </p:cTn>
-                        </p:par>
-                      </p:childTnLst>
-                    </p:cTn>
-                  </p:par>
-                  <p:par>
-                    <p:cTn id="8" fill="hold">
-                      <p:stCondLst>
-                        <p:cond delay="indefinite"/>
-                      </p:stCondLst>
-                      <p:childTnLst>
-                        <p:par>
-                          <p:cTn id="9" fill="hold">
-                            <p:stCondLst>
-                              <p:cond delay="0"/>
-                            </p:stCondLst>
-                            <p:childTnLst>
-                              <p:par>
-                                <p:cTn id="10" presetID="10" presetClass="entr" presetSubtype="0" fill="hold" grpId="0" nodeType="clickEffect">
-                                  <p:stCondLst>
-                                    <p:cond delay="0"/>
-                                  </p:stCondLst>
-                                  <p:childTnLst>
-                                    <p:set>
-                                      <p:cBhvr>
-                                        <p:cTn id="11" dur="1" fill="hold">
-                                          <p:stCondLst>
-                                            <p:cond delay="0"/>
-                                          </p:stCondLst>
-                                        </p:cTn>
-                                        <p:tgtEl>
-                                          <p:spTgt spid="3">
-                                            <p:txEl>
-                                              <p:pRg st="2" end="2"/>
-                                            </p:txEl>
-                                          </p:spTgt>
-                                        </p:tgtEl>
-                                        <p:attrNameLst>
-                                          <p:attrName>style.visibility</p:attrName>
-                                        </p:attrNameLst>
-                                      </p:cBhvr>
-                                      <p:to>
-                                        <p:strVal val="visible"/>
-                                      </p:to>
-                                    </p:set>
-                                    <p:animEffect transition="in" filter="fade">
-                                      <p:cBhvr>
-                                        <p:cTn id="12" dur="500"/>
-                                        <p:tgtEl>
-                                          <p:spTgt spid="3">
-                                            <p:txEl>
-                                              <p:pRg st="2" end="2"/>
-                                            </p:txEl>
-                                          </p:spTgt>
-                                        </p:tgtEl>
-                                      </p:cBhvr>
-                                    </p:animEffect>
-                                  </p:childTnLst>
-                                </p:cTn>
-                              </p:par>
-                            </p:childTnLst>
-                          </p:cTn>
-                        </p:par>
-                      </p:childTnLst>
-                    </p:cTn>
-                  </p:par>
-                  <p:par>
-                    <p:cTn id="13" fill="hold">
-                      <p:stCondLst>
-                        <p:cond delay="indefinite"/>
-                      </p:stCondLst>
-                      <p:childTnLst>
-                        <p:par>
-                          <p:cTn id="14" fill="hold">
-                            <p:stCondLst>
-                              <p:cond delay="0"/>
-                            </p:stCondLst>
-                            <p:childTnLst>
-                              <p:par>
-                                <p:cTn id="15" presetID="10" presetClass="entr" presetSubtype="0" fill="hold" grpId="0" nodeType="clickEffect">
-                                  <p:stCondLst>
-                                    <p:cond delay="0"/>
-                                  </p:stCondLst>
-                                  <p:childTnLst>
-                                    <p:set>
-                                      <p:cBhvr>
-                                        <p:cTn id="16" dur="1" fill="hold">
-                                          <p:stCondLst>
-                                            <p:cond delay="0"/>
-                                          </p:stCondLst>
-                                        </p:cTn>
-                                        <p:tgtEl>
-                                          <p:spTgt spid="3">
-                                            <p:txEl>
-                                              <p:pRg st="4" end="4"/>
-                                            </p:txEl>
-                                          </p:spTgt>
-                                        </p:tgtEl>
-                                        <p:attrNameLst>
-                                          <p:attrName>style.visibility</p:attrName>
-                                        </p:attrNameLst>
-                                      </p:cBhvr>
-                                      <p:to>
-                                        <p:strVal val="visible"/>
-                                      </p:to>
-                                    </p:set>
-                                    <p:animEffect transition="in" filter="fade">
-                                      <p:cBhvr>
-                                        <p:cTn id="17" dur="500"/>
-                                        <p:tgtEl>
-                                          <p:spTgt spid="3">
-                                            <p:txEl>
-                                              <p:pRg st="4" end="4"/>
-                                            </p:txEl>
-                                          </p:spTgt>
-                                        </p:tgtEl>
-                                      </p:cBhvr>
-                                    </p:animEffect>
-                                  </p:childTnLst>
-                                </p:cTn>
-                              </p:par>
-                            </p:childTnLst>
-                          </p:cTn>
-                        </p:par>
-                      </p:childTnLst>
-                    </p:cTn>
-                  </p:par>
-                  <p:par>
-                    <p:cTn id="18" fill="hold">
-                      <p:stCondLst>
-                        <p:cond delay="indefinite"/>
-                      </p:stCondLst>
-                      <p:childTnLst>
-                        <p:par>
-                          <p:cTn id="19" fill="hold">
-                            <p:stCondLst>
-                              <p:cond delay="0"/>
-                            </p:stCondLst>
-                            <p:childTnLst>
-                              <p:par>
-                                <p:cTn id="20" presetID="10" presetClass="entr" presetSubtype="0" fill="hold" grpId="0" nodeType="clickEffect">
-                                  <p:stCondLst>
-                                    <p:cond delay="0"/>
-                                  </p:stCondLst>
-                                  <p:childTnLst>
-                                    <p:set>
-                                      <p:cBhvr>
-                                        <p:cTn id="21" dur="1" fill="hold">
-                                          <p:stCondLst>
-                                            <p:cond delay="0"/>
-                                          </p:stCondLst>
-                                        </p:cTn>
-                                        <p:tgtEl>
-                                          <p:spTgt spid="3">
-                                            <p:txEl>
-                                              <p:pRg st="5" end="5"/>
-                                            </p:txEl>
-                                          </p:spTgt>
-                                        </p:tgtEl>
-                                        <p:attrNameLst>
-                                          <p:attrName>style.visibility</p:attrName>
-                                        </p:attrNameLst>
-                                      </p:cBhvr>
-                                      <p:to>
-                                        <p:strVal val="visible"/>
-                                      </p:to>
-                                    </p:set>
-                                    <p:animEffect transition="in" filter="fade">
-                                      <p:cBhvr>
-                                        <p:cTn id="22" dur="500"/>
-                                        <p:tgtEl>
-                                          <p:spTgt spid="3">
-                                            <p:txEl>
-                                              <p:pRg st="5" end="5"/>
-                                            </p:txEl>
-                                          </p:spTgt>
-                                        </p:tgtEl>
-                                      </p:cBhvr>
-                                    </p:animEffect>
-                                  </p:childTnLst>
-                                </p:cTn>
-                              </p:par>
-                            </p:childTnLst>
-                          </p:cTn>
-                        </p:par>
-                      </p:childTnLst>
-                    </p:cTn>
-                  </p:par>
-                  <p:par>
-                    <p:cTn id="23" fill="hold">
-                      <p:stCondLst>
-                        <p:cond delay="indefinite"/>
-                      </p:stCondLst>
-                      <p:childTnLst>
-                        <p:par>
-                          <p:cTn id="24" fill="hold">
-                            <p:stCondLst>
-                              <p:cond delay="0"/>
-                            </p:stCondLst>
-                            <p:childTnLst>
-                              <p:par>
-                                <p:cTn id="25" presetID="10" presetClass="entr" presetSubtype="0" fill="hold" grpId="0" nodeType="clickEffect">
-                                  <p:stCondLst>
-                                    <p:cond delay="0"/>
-                                  </p:stCondLst>
-                                  <p:childTnLst>
-                                    <p:set>
-                                      <p:cBhvr>
-                                        <p:cTn id="26" dur="1" fill="hold">
-                                          <p:stCondLst>
-                                            <p:cond delay="0"/>
-                                          </p:stCondLst>
-                                        </p:cTn>
-                                        <p:tgtEl>
-                                          <p:spTgt spid="3">
-                                            <p:txEl>
-                                              <p:pRg st="7" end="7"/>
-                                            </p:txEl>
-                                          </p:spTgt>
-                                        </p:tgtEl>
-                                        <p:attrNameLst>
-                                          <p:attrName>style.visibility</p:attrName>
-                                        </p:attrNameLst>
-                                      </p:cBhvr>
-                                      <p:to>
-                                        <p:strVal val="visible"/>
-                                      </p:to>
-                                    </p:set>
-                                    <p:animEffect transition="in" filter="fade">
-                                      <p:cBhvr>
-                                        <p:cTn id="27" dur="500"/>
-                                        <p:tgtEl>
-                                          <p:spTgt spid="3">
-                                            <p:txEl>
-                                              <p:pRg st="7" end="7"/>
-                                            </p:txEl>
-                                          </p:spTgt>
-                                        </p:tgtEl>
-                                      </p:cBhvr>
-                                    </p:animEffect>
-                                  </p:childTnLst>
-                                </p:cTn>
-                              </p:par>
-                            </p:childTnLst>
-                          </p:cTn>
-                        </p:par>
-                      </p:childTnLst>
-                    </p:cTn>
-                  </p:par>
-                </p:childTnLst>
-              </p:cTn>
-              <p:prevCondLst>
-                <p:cond evt="onPrev" delay="0">
-                  <p:tgtEl>
-                    <p:sldTgt/>
-                  </p:tgtEl>
-                </p:cond>
-              </p:prevCondLst>
-              <p:nextCondLst>
-                <p:cond evt="onNext" delay="0">
-                  <p:tgtEl>
-                    <p:sldTgt/>
-                  </p:tgtEl>
-                </p:cond>
-              </p:nextCondLst>
-            </p:seq>
-          </p:childTnLst>
-        </p:cTn>
-      </p:par>
-    </p:tnLst>
-    <p:bldLst>
-      <p:bldP spid="3" grpId="0" build="p"/>
-    </p:bldLst>
-  </p:timing>
 </p:sld>
 </file>
 

</xml_diff>